<commit_message>
EST-467: updates as per ISIS-1027 (rename Optionality enum values)
</commit_message>
<xml_diff>
--- a/docs/application-tenancy-analysis/application-tenancy-analysis.pptx
+++ b/docs/application-tenancy-analysis/application-tenancy-analysis.pptx
@@ -289,7 +289,7 @@
           <a:p>
             <a:fld id="{D40120A2-33D2-4057-96AA-2C96379B894C}" type="datetimeFigureOut">
               <a:rPr lang="en-GB" smtClean="0"/>
-              <a:t>29/01/2015</a:t>
+              <a:t>05/02/2015</a:t>
             </a:fld>
             <a:endParaRPr lang="en-GB"/>
           </a:p>
@@ -459,7 +459,7 @@
           <a:p>
             <a:fld id="{D40120A2-33D2-4057-96AA-2C96379B894C}" type="datetimeFigureOut">
               <a:rPr lang="en-GB" smtClean="0"/>
-              <a:t>29/01/2015</a:t>
+              <a:t>05/02/2015</a:t>
             </a:fld>
             <a:endParaRPr lang="en-GB"/>
           </a:p>
@@ -639,7 +639,7 @@
           <a:p>
             <a:fld id="{D40120A2-33D2-4057-96AA-2C96379B894C}" type="datetimeFigureOut">
               <a:rPr lang="en-GB" smtClean="0"/>
-              <a:t>29/01/2015</a:t>
+              <a:t>05/02/2015</a:t>
             </a:fld>
             <a:endParaRPr lang="en-GB"/>
           </a:p>
@@ -809,7 +809,7 @@
           <a:p>
             <a:fld id="{D40120A2-33D2-4057-96AA-2C96379B894C}" type="datetimeFigureOut">
               <a:rPr lang="en-GB" smtClean="0"/>
-              <a:t>29/01/2015</a:t>
+              <a:t>05/02/2015</a:t>
             </a:fld>
             <a:endParaRPr lang="en-GB"/>
           </a:p>
@@ -1055,7 +1055,7 @@
           <a:p>
             <a:fld id="{D40120A2-33D2-4057-96AA-2C96379B894C}" type="datetimeFigureOut">
               <a:rPr lang="en-GB" smtClean="0"/>
-              <a:t>29/01/2015</a:t>
+              <a:t>05/02/2015</a:t>
             </a:fld>
             <a:endParaRPr lang="en-GB"/>
           </a:p>
@@ -1343,7 +1343,7 @@
           <a:p>
             <a:fld id="{D40120A2-33D2-4057-96AA-2C96379B894C}" type="datetimeFigureOut">
               <a:rPr lang="en-GB" smtClean="0"/>
-              <a:t>29/01/2015</a:t>
+              <a:t>05/02/2015</a:t>
             </a:fld>
             <a:endParaRPr lang="en-GB"/>
           </a:p>
@@ -1765,7 +1765,7 @@
           <a:p>
             <a:fld id="{D40120A2-33D2-4057-96AA-2C96379B894C}" type="datetimeFigureOut">
               <a:rPr lang="en-GB" smtClean="0"/>
-              <a:t>29/01/2015</a:t>
+              <a:t>05/02/2015</a:t>
             </a:fld>
             <a:endParaRPr lang="en-GB"/>
           </a:p>
@@ -1883,7 +1883,7 @@
           <a:p>
             <a:fld id="{D40120A2-33D2-4057-96AA-2C96379B894C}" type="datetimeFigureOut">
               <a:rPr lang="en-GB" smtClean="0"/>
-              <a:t>29/01/2015</a:t>
+              <a:t>05/02/2015</a:t>
             </a:fld>
             <a:endParaRPr lang="en-GB"/>
           </a:p>
@@ -1978,7 +1978,7 @@
           <a:p>
             <a:fld id="{D40120A2-33D2-4057-96AA-2C96379B894C}" type="datetimeFigureOut">
               <a:rPr lang="en-GB" smtClean="0"/>
-              <a:t>29/01/2015</a:t>
+              <a:t>05/02/2015</a:t>
             </a:fld>
             <a:endParaRPr lang="en-GB"/>
           </a:p>
@@ -2255,7 +2255,7 @@
           <a:p>
             <a:fld id="{D40120A2-33D2-4057-96AA-2C96379B894C}" type="datetimeFigureOut">
               <a:rPr lang="en-GB" smtClean="0"/>
-              <a:t>29/01/2015</a:t>
+              <a:t>05/02/2015</a:t>
             </a:fld>
             <a:endParaRPr lang="en-GB"/>
           </a:p>
@@ -2508,7 +2508,7 @@
           <a:p>
             <a:fld id="{D40120A2-33D2-4057-96AA-2C96379B894C}" type="datetimeFigureOut">
               <a:rPr lang="en-GB" smtClean="0"/>
-              <a:t>29/01/2015</a:t>
+              <a:t>05/02/2015</a:t>
             </a:fld>
             <a:endParaRPr lang="en-GB"/>
           </a:p>
@@ -2721,7 +2721,7 @@
           <a:p>
             <a:fld id="{D40120A2-33D2-4057-96AA-2C96379B894C}" type="datetimeFigureOut">
               <a:rPr lang="en-GB" smtClean="0"/>
-              <a:t>29/01/2015</a:t>
+              <a:t>05/02/2015</a:t>
             </a:fld>
             <a:endParaRPr lang="en-GB"/>
           </a:p>
@@ -3511,10 +3511,10 @@
             <a:schemeClr val="lt1"/>
           </a:lnRef>
           <a:fillRef idx="1">
-            <a:schemeClr val="accent5"/>
+            <a:schemeClr val="accent1"/>
           </a:fillRef>
           <a:effectRef idx="1">
-            <a:schemeClr val="accent5"/>
+            <a:schemeClr val="accent1"/>
           </a:effectRef>
           <a:fontRef idx="minor">
             <a:schemeClr val="lt1"/>

</xml_diff>